<commit_message>
feature selection and irr relations
</commit_message>
<xml_diff>
--- a/docs/Amri_presentation.pptx
+++ b/docs/Amri_presentation.pptx
@@ -6,6 +6,18 @@
   </p:sldMasterIdLst>
   <p:sldIdLst>
     <p:sldId id="256" r:id="rId2"/>
+    <p:sldId id="257" r:id="rId3"/>
+    <p:sldId id="258" r:id="rId4"/>
+    <p:sldId id="259" r:id="rId5"/>
+    <p:sldId id="261" r:id="rId6"/>
+    <p:sldId id="264" r:id="rId7"/>
+    <p:sldId id="262" r:id="rId8"/>
+    <p:sldId id="263" r:id="rId9"/>
+    <p:sldId id="265" r:id="rId10"/>
+    <p:sldId id="266" r:id="rId11"/>
+    <p:sldId id="267" r:id="rId12"/>
+    <p:sldId id="268" r:id="rId13"/>
+    <p:sldId id="260" r:id="rId14"/>
   </p:sldIdLst>
   <p:sldSz cx="12192000" cy="6858000"/>
   <p:notesSz cx="6858000" cy="9144000"/>
@@ -104,6 +116,11 @@
       </a:defRPr>
     </a:lvl9pPr>
   </p:defaultTextStyle>
+  <p:extLst>
+    <p:ext uri="{EFAFB233-063F-42B5-8137-9DF3F51BA10A}">
+      <p15:sldGuideLst xmlns:p15="http://schemas.microsoft.com/office/powerpoint/2012/main"/>
+    </p:ext>
+  </p:extLst>
 </p:presentation>
 </file>
 
@@ -2997,9 +3014,16 @@
             <p:ph type="subTitle" idx="1"/>
           </p:nvPr>
         </p:nvSpPr>
-        <p:spPr/>
-        <p:txBody>
-          <a:bodyPr/>
+        <p:spPr>
+          <a:xfrm>
+            <a:off x="1524000" y="3613913"/>
+            <a:ext cx="9144000" cy="1655762"/>
+          </a:xfrm>
+        </p:spPr>
+        <p:txBody>
+          <a:bodyPr>
+            <a:normAutofit lnSpcReduction="10000"/>
+          </a:bodyPr>
           <a:lstStyle/>
           <a:p>
             <a:r>
@@ -3015,16 +3039,1061 @@
           <a:p>
             <a:r>
               <a:rPr lang="en-US" dirty="0" smtClean="0"/>
-              <a:t>Supervisor: Jan Poland</a:t>
-            </a:r>
+              <a:t>Supervisor: Jan </a:t>
+            </a:r>
+            <a:r>
+              <a:rPr lang="en-US" dirty="0" smtClean="0"/>
+              <a:t>Poland</a:t>
+            </a:r>
+          </a:p>
+          <a:p>
             <a:endParaRPr lang="en-US" dirty="0"/>
           </a:p>
-        </p:txBody>
-      </p:sp>
+          <a:p>
+            <a:r>
+              <a:rPr lang="en-US" dirty="0" smtClean="0"/>
+              <a:t>March 2016</a:t>
+            </a:r>
+            <a:endParaRPr lang="en-US" dirty="0"/>
+          </a:p>
+        </p:txBody>
+      </p:sp>
+      <p:pic>
+        <p:nvPicPr>
+          <p:cNvPr id="4" name="Picture 3"/>
+          <p:cNvPicPr>
+            <a:picLocks noChangeAspect="1"/>
+          </p:cNvPicPr>
+          <p:nvPr/>
+        </p:nvPicPr>
+        <p:blipFill>
+          <a:blip r:embed="rId2" cstate="print">
+            <a:extLst>
+              <a:ext uri="{28A0092B-C50C-407E-A947-70E740481C1C}">
+                <a14:useLocalDpi xmlns:a14="http://schemas.microsoft.com/office/drawing/2010/main" val="0"/>
+              </a:ext>
+            </a:extLst>
+          </a:blip>
+          <a:stretch>
+            <a:fillRect/>
+          </a:stretch>
+        </p:blipFill>
+        <p:spPr>
+          <a:xfrm>
+            <a:off x="11227417" y="6234544"/>
+            <a:ext cx="866432" cy="348739"/>
+          </a:xfrm>
+          <a:prstGeom prst="rect">
+            <a:avLst/>
+          </a:prstGeom>
+        </p:spPr>
+      </p:pic>
     </p:spTree>
     <p:extLst>
       <p:ext uri="{BB962C8B-B14F-4D97-AF65-F5344CB8AC3E}">
         <p14:creationId xmlns:p14="http://schemas.microsoft.com/office/powerpoint/2010/main" val="591360813"/>
+      </p:ext>
+    </p:extLst>
+  </p:cSld>
+  <p:clrMapOvr>
+    <a:masterClrMapping/>
+  </p:clrMapOvr>
+</p:sld>
+</file>
+
+<file path=ppt/slides/slide10.xml><?xml version="1.0" encoding="utf-8"?>
+<p:sld xmlns:a="http://schemas.openxmlformats.org/drawingml/2006/main" xmlns:r="http://schemas.openxmlformats.org/officeDocument/2006/relationships" xmlns:p="http://schemas.openxmlformats.org/presentationml/2006/main">
+  <p:cSld>
+    <p:spTree>
+      <p:nvGrpSpPr>
+        <p:cNvPr id="1" name=""/>
+        <p:cNvGrpSpPr/>
+        <p:nvPr/>
+      </p:nvGrpSpPr>
+      <p:grpSpPr>
+        <a:xfrm>
+          <a:off x="0" y="0"/>
+          <a:ext cx="0" cy="0"/>
+          <a:chOff x="0" y="0"/>
+          <a:chExt cx="0" cy="0"/>
+        </a:xfrm>
+      </p:grpSpPr>
+      <p:sp>
+        <p:nvSpPr>
+          <p:cNvPr id="2" name="Title 1"/>
+          <p:cNvSpPr>
+            <a:spLocks noGrp="1"/>
+          </p:cNvSpPr>
+          <p:nvPr>
+            <p:ph type="title"/>
+          </p:nvPr>
+        </p:nvSpPr>
+        <p:spPr/>
+        <p:txBody>
+          <a:bodyPr/>
+          <a:lstStyle/>
+          <a:p>
+            <a:r>
+              <a:rPr lang="en-US" dirty="0" smtClean="0"/>
+              <a:t>Estimating diffuse from Image features</a:t>
+            </a:r>
+            <a:endParaRPr lang="en-US" dirty="0"/>
+          </a:p>
+        </p:txBody>
+      </p:sp>
+      <p:sp>
+        <p:nvSpPr>
+          <p:cNvPr id="3" name="Content Placeholder 2"/>
+          <p:cNvSpPr>
+            <a:spLocks noGrp="1"/>
+          </p:cNvSpPr>
+          <p:nvPr>
+            <p:ph idx="1"/>
+          </p:nvPr>
+        </p:nvSpPr>
+        <p:spPr/>
+        <p:txBody>
+          <a:bodyPr/>
+          <a:lstStyle/>
+          <a:p>
+            <a:r>
+              <a:rPr lang="en-US" dirty="0" smtClean="0"/>
+              <a:t>Total cloud coverage</a:t>
+            </a:r>
+          </a:p>
+          <a:p>
+            <a:r>
+              <a:rPr lang="en-US" dirty="0" smtClean="0"/>
+              <a:t>Saturation around sun</a:t>
+            </a:r>
+          </a:p>
+          <a:p>
+            <a:r>
+              <a:rPr lang="en-US" dirty="0" smtClean="0"/>
+              <a:t>Clear-sky diffuse (weighted by cloud coverage)</a:t>
+            </a:r>
+          </a:p>
+          <a:p>
+            <a:r>
+              <a:rPr lang="en-US" dirty="0" err="1" smtClean="0"/>
+              <a:t>sun_flag</a:t>
+            </a:r>
+            <a:endParaRPr lang="en-US" dirty="0" smtClean="0"/>
+          </a:p>
+          <a:p>
+            <a:r>
+              <a:rPr lang="en-US" dirty="0" smtClean="0"/>
+              <a:t>Cloud coverage in circumsolar area</a:t>
+            </a:r>
+          </a:p>
+          <a:p>
+            <a:r>
+              <a:rPr lang="en-US" dirty="0" smtClean="0"/>
+              <a:t>Sun zenith angle</a:t>
+            </a:r>
+          </a:p>
+          <a:p>
+            <a:r>
+              <a:rPr lang="en-US" dirty="0" smtClean="0"/>
+              <a:t>Day of the year</a:t>
+            </a:r>
+          </a:p>
+          <a:p>
+            <a:r>
+              <a:rPr lang="en-US" dirty="0" smtClean="0"/>
+              <a:t>Time of the day</a:t>
+            </a:r>
+            <a:endParaRPr lang="en-US" dirty="0"/>
+          </a:p>
+        </p:txBody>
+      </p:sp>
+    </p:spTree>
+    <p:extLst>
+      <p:ext uri="{BB962C8B-B14F-4D97-AF65-F5344CB8AC3E}">
+        <p14:creationId xmlns:p14="http://schemas.microsoft.com/office/powerpoint/2010/main" val="2017493524"/>
+      </p:ext>
+    </p:extLst>
+  </p:cSld>
+  <p:clrMapOvr>
+    <a:masterClrMapping/>
+  </p:clrMapOvr>
+</p:sld>
+</file>
+
+<file path=ppt/slides/slide11.xml><?xml version="1.0" encoding="utf-8"?>
+<p:sld xmlns:a="http://schemas.openxmlformats.org/drawingml/2006/main" xmlns:r="http://schemas.openxmlformats.org/officeDocument/2006/relationships" xmlns:p="http://schemas.openxmlformats.org/presentationml/2006/main">
+  <p:cSld>
+    <p:spTree>
+      <p:nvGrpSpPr>
+        <p:cNvPr id="1" name=""/>
+        <p:cNvGrpSpPr/>
+        <p:nvPr/>
+      </p:nvGrpSpPr>
+      <p:grpSpPr>
+        <a:xfrm>
+          <a:off x="0" y="0"/>
+          <a:ext cx="0" cy="0"/>
+          <a:chOff x="0" y="0"/>
+          <a:chExt cx="0" cy="0"/>
+        </a:xfrm>
+      </p:grpSpPr>
+      <p:sp>
+        <p:nvSpPr>
+          <p:cNvPr id="2" name="Title 1"/>
+          <p:cNvSpPr>
+            <a:spLocks noGrp="1"/>
+          </p:cNvSpPr>
+          <p:nvPr>
+            <p:ph type="title"/>
+          </p:nvPr>
+        </p:nvSpPr>
+        <p:spPr/>
+        <p:txBody>
+          <a:bodyPr/>
+          <a:lstStyle/>
+          <a:p>
+            <a:r>
+              <a:rPr lang="en-US" dirty="0" smtClean="0"/>
+              <a:t>Regression result</a:t>
+            </a:r>
+            <a:endParaRPr lang="en-US" dirty="0"/>
+          </a:p>
+        </p:txBody>
+      </p:sp>
+      <p:sp>
+        <p:nvSpPr>
+          <p:cNvPr id="3" name="Content Placeholder 2"/>
+          <p:cNvSpPr>
+            <a:spLocks noGrp="1"/>
+          </p:cNvSpPr>
+          <p:nvPr>
+            <p:ph idx="1"/>
+          </p:nvPr>
+        </p:nvSpPr>
+        <p:spPr/>
+        <p:txBody>
+          <a:bodyPr/>
+          <a:lstStyle/>
+          <a:p>
+            <a:endParaRPr lang="en-US" dirty="0"/>
+          </a:p>
+        </p:txBody>
+      </p:sp>
+    </p:spTree>
+    <p:extLst>
+      <p:ext uri="{BB962C8B-B14F-4D97-AF65-F5344CB8AC3E}">
+        <p14:creationId xmlns:p14="http://schemas.microsoft.com/office/powerpoint/2010/main" val="1593731082"/>
+      </p:ext>
+    </p:extLst>
+  </p:cSld>
+  <p:clrMapOvr>
+    <a:masterClrMapping/>
+  </p:clrMapOvr>
+</p:sld>
+</file>
+
+<file path=ppt/slides/slide12.xml><?xml version="1.0" encoding="utf-8"?>
+<p:sld xmlns:a="http://schemas.openxmlformats.org/drawingml/2006/main" xmlns:r="http://schemas.openxmlformats.org/officeDocument/2006/relationships" xmlns:p="http://schemas.openxmlformats.org/presentationml/2006/main">
+  <p:cSld>
+    <p:spTree>
+      <p:nvGrpSpPr>
+        <p:cNvPr id="1" name=""/>
+        <p:cNvGrpSpPr/>
+        <p:nvPr/>
+      </p:nvGrpSpPr>
+      <p:grpSpPr>
+        <a:xfrm>
+          <a:off x="0" y="0"/>
+          <a:ext cx="0" cy="0"/>
+          <a:chOff x="0" y="0"/>
+          <a:chExt cx="0" cy="0"/>
+        </a:xfrm>
+      </p:grpSpPr>
+      <p:sp>
+        <p:nvSpPr>
+          <p:cNvPr id="2" name="Title 1"/>
+          <p:cNvSpPr>
+            <a:spLocks noGrp="1"/>
+          </p:cNvSpPr>
+          <p:nvPr>
+            <p:ph type="title"/>
+          </p:nvPr>
+        </p:nvSpPr>
+        <p:spPr/>
+        <p:txBody>
+          <a:bodyPr/>
+          <a:lstStyle/>
+          <a:p>
+            <a:r>
+              <a:rPr lang="en-US" dirty="0" smtClean="0"/>
+              <a:t>Application in irradiance forecast</a:t>
+            </a:r>
+            <a:endParaRPr lang="en-US" dirty="0"/>
+          </a:p>
+        </p:txBody>
+      </p:sp>
+      <p:sp>
+        <p:nvSpPr>
+          <p:cNvPr id="3" name="Content Placeholder 2"/>
+          <p:cNvSpPr>
+            <a:spLocks noGrp="1"/>
+          </p:cNvSpPr>
+          <p:nvPr>
+            <p:ph idx="1"/>
+          </p:nvPr>
+        </p:nvSpPr>
+        <p:spPr/>
+        <p:txBody>
+          <a:bodyPr/>
+          <a:lstStyle/>
+          <a:p>
+            <a:r>
+              <a:rPr lang="en-US" dirty="0" smtClean="0"/>
+              <a:t>Using optical flow to extract clouds’ motion vector</a:t>
+            </a:r>
+          </a:p>
+          <a:p>
+            <a:r>
+              <a:rPr lang="en-US" dirty="0" smtClean="0"/>
+              <a:t>Move the clouds with same motion vector.</a:t>
+            </a:r>
+            <a:endParaRPr lang="en-US" dirty="0"/>
+          </a:p>
+        </p:txBody>
+      </p:sp>
+    </p:spTree>
+    <p:extLst>
+      <p:ext uri="{BB962C8B-B14F-4D97-AF65-F5344CB8AC3E}">
+        <p14:creationId xmlns:p14="http://schemas.microsoft.com/office/powerpoint/2010/main" val="3670173647"/>
+      </p:ext>
+    </p:extLst>
+  </p:cSld>
+  <p:clrMapOvr>
+    <a:masterClrMapping/>
+  </p:clrMapOvr>
+</p:sld>
+</file>
+
+<file path=ppt/slides/slide13.xml><?xml version="1.0" encoding="utf-8"?>
+<p:sld xmlns:a="http://schemas.openxmlformats.org/drawingml/2006/main" xmlns:r="http://schemas.openxmlformats.org/officeDocument/2006/relationships" xmlns:p="http://schemas.openxmlformats.org/presentationml/2006/main">
+  <p:cSld>
+    <p:spTree>
+      <p:nvGrpSpPr>
+        <p:cNvPr id="1" name=""/>
+        <p:cNvGrpSpPr/>
+        <p:nvPr/>
+      </p:nvGrpSpPr>
+      <p:grpSpPr>
+        <a:xfrm>
+          <a:off x="0" y="0"/>
+          <a:ext cx="0" cy="0"/>
+          <a:chOff x="0" y="0"/>
+          <a:chExt cx="0" cy="0"/>
+        </a:xfrm>
+      </p:grpSpPr>
+      <p:sp>
+        <p:nvSpPr>
+          <p:cNvPr id="2" name="Title 1"/>
+          <p:cNvSpPr>
+            <a:spLocks noGrp="1"/>
+          </p:cNvSpPr>
+          <p:nvPr>
+            <p:ph type="title"/>
+          </p:nvPr>
+        </p:nvSpPr>
+        <p:spPr/>
+        <p:txBody>
+          <a:bodyPr/>
+          <a:lstStyle/>
+          <a:p>
+            <a:r>
+              <a:rPr lang="en-US" dirty="0" smtClean="0"/>
+              <a:t>Summary</a:t>
+            </a:r>
+            <a:endParaRPr lang="en-US" dirty="0"/>
+          </a:p>
+        </p:txBody>
+      </p:sp>
+      <p:sp>
+        <p:nvSpPr>
+          <p:cNvPr id="3" name="Content Placeholder 2"/>
+          <p:cNvSpPr>
+            <a:spLocks noGrp="1"/>
+          </p:cNvSpPr>
+          <p:nvPr>
+            <p:ph idx="1"/>
+          </p:nvPr>
+        </p:nvSpPr>
+        <p:spPr/>
+        <p:txBody>
+          <a:bodyPr/>
+          <a:lstStyle/>
+          <a:p>
+            <a:endParaRPr lang="en-US" dirty="0"/>
+          </a:p>
+        </p:txBody>
+      </p:sp>
+    </p:spTree>
+    <p:extLst>
+      <p:ext uri="{BB962C8B-B14F-4D97-AF65-F5344CB8AC3E}">
+        <p14:creationId xmlns:p14="http://schemas.microsoft.com/office/powerpoint/2010/main" val="3027019059"/>
+      </p:ext>
+    </p:extLst>
+  </p:cSld>
+  <p:clrMapOvr>
+    <a:masterClrMapping/>
+  </p:clrMapOvr>
+</p:sld>
+</file>
+
+<file path=ppt/slides/slide2.xml><?xml version="1.0" encoding="utf-8"?>
+<p:sld xmlns:a="http://schemas.openxmlformats.org/drawingml/2006/main" xmlns:r="http://schemas.openxmlformats.org/officeDocument/2006/relationships" xmlns:p="http://schemas.openxmlformats.org/presentationml/2006/main">
+  <p:cSld>
+    <p:spTree>
+      <p:nvGrpSpPr>
+        <p:cNvPr id="1" name=""/>
+        <p:cNvGrpSpPr/>
+        <p:nvPr/>
+      </p:nvGrpSpPr>
+      <p:grpSpPr>
+        <a:xfrm>
+          <a:off x="0" y="0"/>
+          <a:ext cx="0" cy="0"/>
+          <a:chOff x="0" y="0"/>
+          <a:chExt cx="0" cy="0"/>
+        </a:xfrm>
+      </p:grpSpPr>
+      <p:sp>
+        <p:nvSpPr>
+          <p:cNvPr id="2" name="Title 1"/>
+          <p:cNvSpPr>
+            <a:spLocks noGrp="1"/>
+          </p:cNvSpPr>
+          <p:nvPr>
+            <p:ph type="title"/>
+          </p:nvPr>
+        </p:nvSpPr>
+        <p:spPr/>
+        <p:txBody>
+          <a:bodyPr/>
+          <a:lstStyle/>
+          <a:p>
+            <a:r>
+              <a:rPr lang="en-US" dirty="0" smtClean="0"/>
+              <a:t>Motivation &amp; goal</a:t>
+            </a:r>
+            <a:endParaRPr lang="en-US" dirty="0"/>
+          </a:p>
+        </p:txBody>
+      </p:sp>
+      <p:sp>
+        <p:nvSpPr>
+          <p:cNvPr id="3" name="Content Placeholder 2"/>
+          <p:cNvSpPr>
+            <a:spLocks noGrp="1"/>
+          </p:cNvSpPr>
+          <p:nvPr>
+            <p:ph idx="1"/>
+          </p:nvPr>
+        </p:nvSpPr>
+        <p:spPr/>
+        <p:txBody>
+          <a:bodyPr/>
+          <a:lstStyle/>
+          <a:p>
+            <a:endParaRPr lang="en-US"/>
+          </a:p>
+        </p:txBody>
+      </p:sp>
+    </p:spTree>
+    <p:extLst>
+      <p:ext uri="{BB962C8B-B14F-4D97-AF65-F5344CB8AC3E}">
+        <p14:creationId xmlns:p14="http://schemas.microsoft.com/office/powerpoint/2010/main" val="1485737452"/>
+      </p:ext>
+    </p:extLst>
+  </p:cSld>
+  <p:clrMapOvr>
+    <a:masterClrMapping/>
+  </p:clrMapOvr>
+</p:sld>
+</file>
+
+<file path=ppt/slides/slide3.xml><?xml version="1.0" encoding="utf-8"?>
+<p:sld xmlns:a="http://schemas.openxmlformats.org/drawingml/2006/main" xmlns:r="http://schemas.openxmlformats.org/officeDocument/2006/relationships" xmlns:p="http://schemas.openxmlformats.org/presentationml/2006/main">
+  <p:cSld>
+    <p:spTree>
+      <p:nvGrpSpPr>
+        <p:cNvPr id="1" name=""/>
+        <p:cNvGrpSpPr/>
+        <p:nvPr/>
+      </p:nvGrpSpPr>
+      <p:grpSpPr>
+        <a:xfrm>
+          <a:off x="0" y="0"/>
+          <a:ext cx="0" cy="0"/>
+          <a:chOff x="0" y="0"/>
+          <a:chExt cx="0" cy="0"/>
+        </a:xfrm>
+      </p:grpSpPr>
+      <p:sp>
+        <p:nvSpPr>
+          <p:cNvPr id="2" name="Title 1"/>
+          <p:cNvSpPr>
+            <a:spLocks noGrp="1"/>
+          </p:cNvSpPr>
+          <p:nvPr>
+            <p:ph type="title"/>
+          </p:nvPr>
+        </p:nvSpPr>
+        <p:spPr/>
+        <p:txBody>
+          <a:bodyPr/>
+          <a:lstStyle/>
+          <a:p>
+            <a:r>
+              <a:rPr lang="en-US" dirty="0" smtClean="0"/>
+              <a:t>Experimental setup</a:t>
+            </a:r>
+            <a:endParaRPr lang="en-US" dirty="0"/>
+          </a:p>
+        </p:txBody>
+      </p:sp>
+      <p:sp>
+        <p:nvSpPr>
+          <p:cNvPr id="3" name="Content Placeholder 2"/>
+          <p:cNvSpPr>
+            <a:spLocks noGrp="1"/>
+          </p:cNvSpPr>
+          <p:nvPr>
+            <p:ph idx="1"/>
+          </p:nvPr>
+        </p:nvSpPr>
+        <p:spPr/>
+        <p:txBody>
+          <a:bodyPr/>
+          <a:lstStyle/>
+          <a:p>
+            <a:endParaRPr lang="en-US"/>
+          </a:p>
+        </p:txBody>
+      </p:sp>
+    </p:spTree>
+    <p:extLst>
+      <p:ext uri="{BB962C8B-B14F-4D97-AF65-F5344CB8AC3E}">
+        <p14:creationId xmlns:p14="http://schemas.microsoft.com/office/powerpoint/2010/main" val="406137195"/>
+      </p:ext>
+    </p:extLst>
+  </p:cSld>
+  <p:clrMapOvr>
+    <a:masterClrMapping/>
+  </p:clrMapOvr>
+</p:sld>
+</file>
+
+<file path=ppt/slides/slide4.xml><?xml version="1.0" encoding="utf-8"?>
+<p:sld xmlns:a="http://schemas.openxmlformats.org/drawingml/2006/main" xmlns:r="http://schemas.openxmlformats.org/officeDocument/2006/relationships" xmlns:p="http://schemas.openxmlformats.org/presentationml/2006/main">
+  <p:cSld>
+    <p:spTree>
+      <p:nvGrpSpPr>
+        <p:cNvPr id="1" name=""/>
+        <p:cNvGrpSpPr/>
+        <p:nvPr/>
+      </p:nvGrpSpPr>
+      <p:grpSpPr>
+        <a:xfrm>
+          <a:off x="0" y="0"/>
+          <a:ext cx="0" cy="0"/>
+          <a:chOff x="0" y="0"/>
+          <a:chExt cx="0" cy="0"/>
+        </a:xfrm>
+      </p:grpSpPr>
+      <p:sp>
+        <p:nvSpPr>
+          <p:cNvPr id="2" name="Title 1"/>
+          <p:cNvSpPr>
+            <a:spLocks noGrp="1"/>
+          </p:cNvSpPr>
+          <p:nvPr>
+            <p:ph type="title"/>
+          </p:nvPr>
+        </p:nvSpPr>
+        <p:spPr/>
+        <p:txBody>
+          <a:bodyPr/>
+          <a:lstStyle/>
+          <a:p>
+            <a:r>
+              <a:rPr lang="en-US" dirty="0" smtClean="0"/>
+              <a:t>Acquired Data</a:t>
+            </a:r>
+            <a:endParaRPr lang="en-US" dirty="0"/>
+          </a:p>
+        </p:txBody>
+      </p:sp>
+      <p:sp>
+        <p:nvSpPr>
+          <p:cNvPr id="3" name="Content Placeholder 2"/>
+          <p:cNvSpPr>
+            <a:spLocks noGrp="1"/>
+          </p:cNvSpPr>
+          <p:nvPr>
+            <p:ph idx="1"/>
+          </p:nvPr>
+        </p:nvSpPr>
+        <p:spPr/>
+        <p:txBody>
+          <a:bodyPr/>
+          <a:lstStyle/>
+          <a:p>
+            <a:endParaRPr lang="en-US"/>
+          </a:p>
+        </p:txBody>
+      </p:sp>
+    </p:spTree>
+    <p:extLst>
+      <p:ext uri="{BB962C8B-B14F-4D97-AF65-F5344CB8AC3E}">
+        <p14:creationId xmlns:p14="http://schemas.microsoft.com/office/powerpoint/2010/main" val="4149183276"/>
+      </p:ext>
+    </p:extLst>
+  </p:cSld>
+  <p:clrMapOvr>
+    <a:masterClrMapping/>
+  </p:clrMapOvr>
+</p:sld>
+</file>
+
+<file path=ppt/slides/slide5.xml><?xml version="1.0" encoding="utf-8"?>
+<p:sld xmlns:a="http://schemas.openxmlformats.org/drawingml/2006/main" xmlns:r="http://schemas.openxmlformats.org/officeDocument/2006/relationships" xmlns:p="http://schemas.openxmlformats.org/presentationml/2006/main">
+  <p:cSld>
+    <p:spTree>
+      <p:nvGrpSpPr>
+        <p:cNvPr id="1" name=""/>
+        <p:cNvGrpSpPr/>
+        <p:nvPr/>
+      </p:nvGrpSpPr>
+      <p:grpSpPr>
+        <a:xfrm>
+          <a:off x="0" y="0"/>
+          <a:ext cx="0" cy="0"/>
+          <a:chOff x="0" y="0"/>
+          <a:chExt cx="0" cy="0"/>
+        </a:xfrm>
+      </p:grpSpPr>
+      <p:sp>
+        <p:nvSpPr>
+          <p:cNvPr id="2" name="Title 1"/>
+          <p:cNvSpPr>
+            <a:spLocks noGrp="1"/>
+          </p:cNvSpPr>
+          <p:nvPr>
+            <p:ph type="title"/>
+          </p:nvPr>
+        </p:nvSpPr>
+        <p:spPr/>
+        <p:txBody>
+          <a:bodyPr/>
+          <a:lstStyle/>
+          <a:p>
+            <a:r>
+              <a:rPr lang="en-US" dirty="0" smtClean="0"/>
+              <a:t>Camera calibration for sun position</a:t>
+            </a:r>
+            <a:endParaRPr lang="en-US" dirty="0"/>
+          </a:p>
+        </p:txBody>
+      </p:sp>
+      <p:sp>
+        <p:nvSpPr>
+          <p:cNvPr id="3" name="Content Placeholder 2"/>
+          <p:cNvSpPr>
+            <a:spLocks noGrp="1"/>
+          </p:cNvSpPr>
+          <p:nvPr>
+            <p:ph idx="1"/>
+          </p:nvPr>
+        </p:nvSpPr>
+        <p:spPr/>
+        <p:txBody>
+          <a:bodyPr/>
+          <a:lstStyle/>
+          <a:p>
+            <a:endParaRPr lang="en-US" dirty="0"/>
+          </a:p>
+        </p:txBody>
+      </p:sp>
+    </p:spTree>
+    <p:extLst>
+      <p:ext uri="{BB962C8B-B14F-4D97-AF65-F5344CB8AC3E}">
+        <p14:creationId xmlns:p14="http://schemas.microsoft.com/office/powerpoint/2010/main" val="1218247221"/>
+      </p:ext>
+    </p:extLst>
+  </p:cSld>
+  <p:clrMapOvr>
+    <a:masterClrMapping/>
+  </p:clrMapOvr>
+</p:sld>
+</file>
+
+<file path=ppt/slides/slide6.xml><?xml version="1.0" encoding="utf-8"?>
+<p:sld xmlns:a="http://schemas.openxmlformats.org/drawingml/2006/main" xmlns:r="http://schemas.openxmlformats.org/officeDocument/2006/relationships" xmlns:p="http://schemas.openxmlformats.org/presentationml/2006/main">
+  <p:cSld>
+    <p:spTree>
+      <p:nvGrpSpPr>
+        <p:cNvPr id="1" name=""/>
+        <p:cNvGrpSpPr/>
+        <p:nvPr/>
+      </p:nvGrpSpPr>
+      <p:grpSpPr>
+        <a:xfrm>
+          <a:off x="0" y="0"/>
+          <a:ext cx="0" cy="0"/>
+          <a:chOff x="0" y="0"/>
+          <a:chExt cx="0" cy="0"/>
+        </a:xfrm>
+      </p:grpSpPr>
+      <p:sp>
+        <p:nvSpPr>
+          <p:cNvPr id="2" name="Title 1"/>
+          <p:cNvSpPr>
+            <a:spLocks noGrp="1"/>
+          </p:cNvSpPr>
+          <p:nvPr>
+            <p:ph type="title"/>
+          </p:nvPr>
+        </p:nvSpPr>
+        <p:spPr/>
+        <p:txBody>
+          <a:bodyPr/>
+          <a:lstStyle/>
+          <a:p>
+            <a:r>
+              <a:rPr lang="en-US" dirty="0" smtClean="0"/>
+              <a:t>Estimating </a:t>
+            </a:r>
+            <a:r>
+              <a:rPr lang="en-US" dirty="0"/>
+              <a:t>shadow </a:t>
+            </a:r>
+            <a:r>
+              <a:rPr lang="en-US" dirty="0" smtClean="0"/>
+              <a:t>ratio on the plant site</a:t>
+            </a:r>
+            <a:endParaRPr lang="en-US" dirty="0"/>
+          </a:p>
+        </p:txBody>
+      </p:sp>
+      <p:sp>
+        <p:nvSpPr>
+          <p:cNvPr id="3" name="Content Placeholder 2"/>
+          <p:cNvSpPr>
+            <a:spLocks noGrp="1"/>
+          </p:cNvSpPr>
+          <p:nvPr>
+            <p:ph idx="1"/>
+          </p:nvPr>
+        </p:nvSpPr>
+        <p:spPr/>
+        <p:txBody>
+          <a:bodyPr/>
+          <a:lstStyle/>
+          <a:p>
+            <a:r>
+              <a:rPr lang="en-US" dirty="0" smtClean="0"/>
+              <a:t>Projecting plant coordinates </a:t>
+            </a:r>
+            <a:r>
+              <a:rPr lang="en-US" dirty="0"/>
+              <a:t>into the </a:t>
+            </a:r>
+            <a:r>
+              <a:rPr lang="en-US" dirty="0" smtClean="0"/>
+              <a:t>sky using assumed cloud height</a:t>
+            </a:r>
+            <a:endParaRPr lang="en-US" dirty="0"/>
+          </a:p>
+        </p:txBody>
+      </p:sp>
+    </p:spTree>
+    <p:extLst>
+      <p:ext uri="{BB962C8B-B14F-4D97-AF65-F5344CB8AC3E}">
+        <p14:creationId xmlns:p14="http://schemas.microsoft.com/office/powerpoint/2010/main" val="1790708887"/>
+      </p:ext>
+    </p:extLst>
+  </p:cSld>
+  <p:clrMapOvr>
+    <a:masterClrMapping/>
+  </p:clrMapOvr>
+</p:sld>
+</file>
+
+<file path=ppt/slides/slide7.xml><?xml version="1.0" encoding="utf-8"?>
+<p:sld xmlns:a="http://schemas.openxmlformats.org/drawingml/2006/main" xmlns:r="http://schemas.openxmlformats.org/officeDocument/2006/relationships" xmlns:p="http://schemas.openxmlformats.org/presentationml/2006/main">
+  <p:cSld>
+    <p:spTree>
+      <p:nvGrpSpPr>
+        <p:cNvPr id="1" name=""/>
+        <p:cNvGrpSpPr/>
+        <p:nvPr/>
+      </p:nvGrpSpPr>
+      <p:grpSpPr>
+        <a:xfrm>
+          <a:off x="0" y="0"/>
+          <a:ext cx="0" cy="0"/>
+          <a:chOff x="0" y="0"/>
+          <a:chExt cx="0" cy="0"/>
+        </a:xfrm>
+      </p:grpSpPr>
+      <p:sp>
+        <p:nvSpPr>
+          <p:cNvPr id="2" name="Title 1"/>
+          <p:cNvSpPr>
+            <a:spLocks noGrp="1"/>
+          </p:cNvSpPr>
+          <p:nvPr>
+            <p:ph type="title"/>
+          </p:nvPr>
+        </p:nvSpPr>
+        <p:spPr/>
+        <p:txBody>
+          <a:bodyPr/>
+          <a:lstStyle/>
+          <a:p>
+            <a:r>
+              <a:rPr lang="en-US" dirty="0" smtClean="0"/>
+              <a:t>Clear-sky irradiance model</a:t>
+            </a:r>
+            <a:endParaRPr lang="en-US" dirty="0"/>
+          </a:p>
+        </p:txBody>
+      </p:sp>
+      <p:sp>
+        <p:nvSpPr>
+          <p:cNvPr id="3" name="Content Placeholder 2"/>
+          <p:cNvSpPr>
+            <a:spLocks noGrp="1"/>
+          </p:cNvSpPr>
+          <p:nvPr>
+            <p:ph idx="1"/>
+          </p:nvPr>
+        </p:nvSpPr>
+        <p:spPr/>
+        <p:txBody>
+          <a:bodyPr/>
+          <a:lstStyle/>
+          <a:p>
+            <a:endParaRPr lang="en-US" dirty="0"/>
+          </a:p>
+        </p:txBody>
+      </p:sp>
+    </p:spTree>
+    <p:extLst>
+      <p:ext uri="{BB962C8B-B14F-4D97-AF65-F5344CB8AC3E}">
+        <p14:creationId xmlns:p14="http://schemas.microsoft.com/office/powerpoint/2010/main" val="960830279"/>
+      </p:ext>
+    </p:extLst>
+  </p:cSld>
+  <p:clrMapOvr>
+    <a:masterClrMapping/>
+  </p:clrMapOvr>
+</p:sld>
+</file>
+
+<file path=ppt/slides/slide8.xml><?xml version="1.0" encoding="utf-8"?>
+<p:sld xmlns:a="http://schemas.openxmlformats.org/drawingml/2006/main" xmlns:r="http://schemas.openxmlformats.org/officeDocument/2006/relationships" xmlns:p="http://schemas.openxmlformats.org/presentationml/2006/main">
+  <p:cSld>
+    <p:spTree>
+      <p:nvGrpSpPr>
+        <p:cNvPr id="1" name=""/>
+        <p:cNvGrpSpPr/>
+        <p:nvPr/>
+      </p:nvGrpSpPr>
+      <p:grpSpPr>
+        <a:xfrm>
+          <a:off x="0" y="0"/>
+          <a:ext cx="0" cy="0"/>
+          <a:chOff x="0" y="0"/>
+          <a:chExt cx="0" cy="0"/>
+        </a:xfrm>
+      </p:grpSpPr>
+      <p:sp>
+        <p:nvSpPr>
+          <p:cNvPr id="2" name="Title 1"/>
+          <p:cNvSpPr>
+            <a:spLocks noGrp="1"/>
+          </p:cNvSpPr>
+          <p:nvPr>
+            <p:ph type="title"/>
+          </p:nvPr>
+        </p:nvSpPr>
+        <p:spPr/>
+        <p:txBody>
+          <a:bodyPr/>
+          <a:lstStyle/>
+          <a:p>
+            <a:r>
+              <a:rPr lang="en-US" dirty="0" smtClean="0"/>
+              <a:t>Estimating current DNI</a:t>
+            </a:r>
+            <a:endParaRPr lang="en-US" dirty="0"/>
+          </a:p>
+        </p:txBody>
+      </p:sp>
+      <p:sp>
+        <p:nvSpPr>
+          <p:cNvPr id="3" name="Content Placeholder 2"/>
+          <p:cNvSpPr>
+            <a:spLocks noGrp="1"/>
+          </p:cNvSpPr>
+          <p:nvPr>
+            <p:ph idx="1"/>
+          </p:nvPr>
+        </p:nvSpPr>
+        <p:spPr/>
+        <p:txBody>
+          <a:bodyPr/>
+          <a:lstStyle/>
+          <a:p>
+            <a:r>
+              <a:rPr lang="en-US" dirty="0"/>
+              <a:t>from clear-sky model</a:t>
+            </a:r>
+          </a:p>
+        </p:txBody>
+      </p:sp>
+    </p:spTree>
+    <p:extLst>
+      <p:ext uri="{BB962C8B-B14F-4D97-AF65-F5344CB8AC3E}">
+        <p14:creationId xmlns:p14="http://schemas.microsoft.com/office/powerpoint/2010/main" val="964316320"/>
+      </p:ext>
+    </p:extLst>
+  </p:cSld>
+  <p:clrMapOvr>
+    <a:masterClrMapping/>
+  </p:clrMapOvr>
+</p:sld>
+</file>
+
+<file path=ppt/slides/slide9.xml><?xml version="1.0" encoding="utf-8"?>
+<p:sld xmlns:a="http://schemas.openxmlformats.org/drawingml/2006/main" xmlns:r="http://schemas.openxmlformats.org/officeDocument/2006/relationships" xmlns:p="http://schemas.openxmlformats.org/presentationml/2006/main">
+  <p:cSld>
+    <p:spTree>
+      <p:nvGrpSpPr>
+        <p:cNvPr id="1" name=""/>
+        <p:cNvGrpSpPr/>
+        <p:nvPr/>
+      </p:nvGrpSpPr>
+      <p:grpSpPr>
+        <a:xfrm>
+          <a:off x="0" y="0"/>
+          <a:ext cx="0" cy="0"/>
+          <a:chOff x="0" y="0"/>
+          <a:chExt cx="0" cy="0"/>
+        </a:xfrm>
+      </p:grpSpPr>
+      <p:sp>
+        <p:nvSpPr>
+          <p:cNvPr id="2" name="Title 1"/>
+          <p:cNvSpPr>
+            <a:spLocks noGrp="1"/>
+          </p:cNvSpPr>
+          <p:nvPr>
+            <p:ph type="title"/>
+          </p:nvPr>
+        </p:nvSpPr>
+        <p:spPr/>
+        <p:txBody>
+          <a:bodyPr/>
+          <a:lstStyle/>
+          <a:p>
+            <a:r>
+              <a:rPr lang="en-US" dirty="0" smtClean="0"/>
+              <a:t>Estimating diffuse from </a:t>
+            </a:r>
+            <a:r>
+              <a:rPr lang="en-US" dirty="0" err="1" smtClean="0"/>
+              <a:t>pyranometers</a:t>
+            </a:r>
+            <a:endParaRPr lang="en-US" dirty="0"/>
+          </a:p>
+        </p:txBody>
+      </p:sp>
+      <p:sp>
+        <p:nvSpPr>
+          <p:cNvPr id="3" name="Content Placeholder 2"/>
+          <p:cNvSpPr>
+            <a:spLocks noGrp="1"/>
+          </p:cNvSpPr>
+          <p:nvPr>
+            <p:ph idx="1"/>
+          </p:nvPr>
+        </p:nvSpPr>
+        <p:spPr/>
+        <p:txBody>
+          <a:bodyPr/>
+          <a:lstStyle/>
+          <a:p>
+            <a:pPr marL="228600" lvl="2">
+              <a:spcBef>
+                <a:spcPts val="1000"/>
+              </a:spcBef>
+            </a:pPr>
+            <a:r>
+              <a:rPr lang="en-US" dirty="0"/>
+              <a:t>Using </a:t>
+            </a:r>
+            <a:r>
+              <a:rPr lang="en-US" dirty="0" err="1"/>
+              <a:t>clear_sun_flag</a:t>
+            </a:r>
+            <a:r>
+              <a:rPr lang="en-US" dirty="0"/>
+              <a:t> and </a:t>
+            </a:r>
+            <a:r>
+              <a:rPr lang="en-US" dirty="0" smtClean="0"/>
+              <a:t>estimated DNI </a:t>
+            </a:r>
+            <a:r>
+              <a:rPr lang="en-US" dirty="0"/>
+              <a:t>for calculating diffuse from tilted </a:t>
+            </a:r>
+            <a:r>
+              <a:rPr lang="en-US" dirty="0" smtClean="0"/>
+              <a:t>plate</a:t>
+            </a:r>
+          </a:p>
+          <a:p>
+            <a:pPr marL="228600" lvl="2">
+              <a:spcBef>
+                <a:spcPts val="1000"/>
+              </a:spcBef>
+            </a:pPr>
+            <a:r>
+              <a:rPr lang="en-US" dirty="0" smtClean="0"/>
+              <a:t>We only consider images with complete visible sun or no sun at all.</a:t>
+            </a:r>
+          </a:p>
+          <a:p>
+            <a:pPr marL="228600" lvl="2">
+              <a:spcBef>
+                <a:spcPts val="1000"/>
+              </a:spcBef>
+            </a:pPr>
+            <a:r>
+              <a:rPr lang="en-US" dirty="0" smtClean="0"/>
+              <a:t>Extracted diffuse from north-facing plate is more robust than south-facing one</a:t>
+            </a:r>
+            <a:endParaRPr lang="en-US" dirty="0"/>
+          </a:p>
+          <a:p>
+            <a:endParaRPr lang="en-US" dirty="0"/>
+          </a:p>
+        </p:txBody>
+      </p:sp>
+    </p:spTree>
+    <p:extLst>
+      <p:ext uri="{BB962C8B-B14F-4D97-AF65-F5344CB8AC3E}">
+        <p14:creationId xmlns:p14="http://schemas.microsoft.com/office/powerpoint/2010/main" val="2165985040"/>
       </p:ext>
     </p:extLst>
   </p:cSld>

</xml_diff>